<commit_message>
Introducing new updates to slides and valuations
</commit_message>
<xml_diff>
--- a/Financial_Presentation.pptx
+++ b/Financial_Presentation.pptx
@@ -226,7 +226,7 @@
           <a:p>
             <a:fld id="{F42BB4D1-BE83-5946-AEDC-6722FADBEEE0}" type="datetimeFigureOut">
               <a:rPr lang="en-PL" smtClean="0"/>
-              <a:t>3/25/24</a:t>
+              <a:t>26/03/2024</a:t>
             </a:fld>
             <a:endParaRPr lang="en-PL"/>
           </a:p>
@@ -999,7 +999,7 @@
           <a:p>
             <a:fld id="{1C5AA6EB-5AB7-F845-B77B-93F2DA665385}" type="datetimeFigureOut">
               <a:rPr lang="en-PL" smtClean="0"/>
-              <a:t>3/25/24</a:t>
+              <a:t>26/03/2024</a:t>
             </a:fld>
             <a:endParaRPr lang="en-PL"/>
           </a:p>
@@ -1199,7 +1199,7 @@
           <a:p>
             <a:fld id="{1C5AA6EB-5AB7-F845-B77B-93F2DA665385}" type="datetimeFigureOut">
               <a:rPr lang="en-PL" smtClean="0"/>
-              <a:t>3/25/24</a:t>
+              <a:t>26/03/2024</a:t>
             </a:fld>
             <a:endParaRPr lang="en-PL"/>
           </a:p>
@@ -1409,7 +1409,7 @@
           <a:p>
             <a:fld id="{1C5AA6EB-5AB7-F845-B77B-93F2DA665385}" type="datetimeFigureOut">
               <a:rPr lang="en-PL" smtClean="0"/>
-              <a:t>3/25/24</a:t>
+              <a:t>26/03/2024</a:t>
             </a:fld>
             <a:endParaRPr lang="en-PL"/>
           </a:p>
@@ -1968,7 +1968,7 @@
           <a:p>
             <a:fld id="{1C5AA6EB-5AB7-F845-B77B-93F2DA665385}" type="datetimeFigureOut">
               <a:rPr lang="en-PL" smtClean="0"/>
-              <a:t>3/25/24</a:t>
+              <a:t>26/03/2024</a:t>
             </a:fld>
             <a:endParaRPr lang="en-PL"/>
           </a:p>
@@ -2244,7 +2244,7 @@
           <a:p>
             <a:fld id="{1C5AA6EB-5AB7-F845-B77B-93F2DA665385}" type="datetimeFigureOut">
               <a:rPr lang="en-PL" smtClean="0"/>
-              <a:t>3/25/24</a:t>
+              <a:t>26/03/2024</a:t>
             </a:fld>
             <a:endParaRPr lang="en-PL"/>
           </a:p>
@@ -2512,7 +2512,7 @@
           <a:p>
             <a:fld id="{1C5AA6EB-5AB7-F845-B77B-93F2DA665385}" type="datetimeFigureOut">
               <a:rPr lang="en-PL" smtClean="0"/>
-              <a:t>3/25/24</a:t>
+              <a:t>26/03/2024</a:t>
             </a:fld>
             <a:endParaRPr lang="en-PL"/>
           </a:p>
@@ -2927,7 +2927,7 @@
           <a:p>
             <a:fld id="{1C5AA6EB-5AB7-F845-B77B-93F2DA665385}" type="datetimeFigureOut">
               <a:rPr lang="en-PL" smtClean="0"/>
-              <a:t>3/25/24</a:t>
+              <a:t>26/03/2024</a:t>
             </a:fld>
             <a:endParaRPr lang="en-PL"/>
           </a:p>
@@ -3069,7 +3069,7 @@
           <a:p>
             <a:fld id="{1C5AA6EB-5AB7-F845-B77B-93F2DA665385}" type="datetimeFigureOut">
               <a:rPr lang="en-PL" smtClean="0"/>
-              <a:t>3/25/24</a:t>
+              <a:t>26/03/2024</a:t>
             </a:fld>
             <a:endParaRPr lang="en-PL"/>
           </a:p>
@@ -3182,7 +3182,7 @@
           <a:p>
             <a:fld id="{1C5AA6EB-5AB7-F845-B77B-93F2DA665385}" type="datetimeFigureOut">
               <a:rPr lang="en-PL" smtClean="0"/>
-              <a:t>3/25/24</a:t>
+              <a:t>26/03/2024</a:t>
             </a:fld>
             <a:endParaRPr lang="en-PL"/>
           </a:p>
@@ -3495,7 +3495,7 @@
           <a:p>
             <a:fld id="{1C5AA6EB-5AB7-F845-B77B-93F2DA665385}" type="datetimeFigureOut">
               <a:rPr lang="en-PL" smtClean="0"/>
-              <a:t>3/25/24</a:t>
+              <a:t>26/03/2024</a:t>
             </a:fld>
             <a:endParaRPr lang="en-PL"/>
           </a:p>
@@ -3784,7 +3784,7 @@
           <a:p>
             <a:fld id="{1C5AA6EB-5AB7-F845-B77B-93F2DA665385}" type="datetimeFigureOut">
               <a:rPr lang="en-PL" smtClean="0"/>
-              <a:t>3/25/24</a:t>
+              <a:t>26/03/2024</a:t>
             </a:fld>
             <a:endParaRPr lang="en-PL"/>
           </a:p>
@@ -4027,7 +4027,7 @@
           <a:p>
             <a:fld id="{1C5AA6EB-5AB7-F845-B77B-93F2DA665385}" type="datetimeFigureOut">
               <a:rPr lang="en-PL" smtClean="0"/>
-              <a:t>3/25/24</a:t>
+              <a:t>26/03/2024</a:t>
             </a:fld>
             <a:endParaRPr lang="en-PL"/>
           </a:p>
@@ -13129,7 +13129,7 @@
           <p:nvPr>
             <p:extLst>
               <p:ext uri="{D42A27DB-BD31-4B8C-83A1-F6EECF244321}">
-                <p14:modId xmlns:p14="http://schemas.microsoft.com/office/powerpoint/2010/main" val="204091476"/>
+                <p14:modId xmlns:p14="http://schemas.microsoft.com/office/powerpoint/2010/main" val="2192105802"/>
               </p:ext>
             </p:extLst>
           </p:nvPr>
@@ -13142,12 +13142,12 @@
           <a:graphicData uri="http://schemas.openxmlformats.org/presentationml/2006/ole">
             <mc:AlternateContent xmlns:mc="http://schemas.openxmlformats.org/markup-compatibility/2006">
               <mc:Choice xmlns:v="urn:schemas-microsoft-com:vml" Requires="v">
-                <p:oleObj name="Arkusz" r:id="rId2" imgW="4546600" imgH="1638300" progId="Excel.Sheet.12">
+                <p:oleObj name="Worksheet" r:id="rId2" imgW="4546600" imgH="1638300" progId="Excel.Sheet.12">
                   <p:embed/>
                 </p:oleObj>
               </mc:Choice>
               <mc:Fallback>
-                <p:oleObj name="Arkusz" r:id="rId2" imgW="4546600" imgH="1638300" progId="Excel.Sheet.12">
+                <p:oleObj name="Worksheet" r:id="rId2" imgW="4546600" imgH="1638300" progId="Excel.Sheet.12">
                   <p:embed/>
                   <p:pic>
                     <p:nvPicPr>

</xml_diff>